<commit_message>
v 1.43, prelim meeting slides
</commit_message>
<xml_diff>
--- a/Docs/Slides/Meeting June 25.pptx
+++ b/Docs/Slides/Meeting June 25.pptx
@@ -6,17 +6,7 @@
   </p:sldMasterIdLst>
   <p:sldIdLst>
     <p:sldId id="305" r:id="rId2"/>
-    <p:sldId id="326" r:id="rId3"/>
-    <p:sldId id="324" r:id="rId4"/>
-    <p:sldId id="325" r:id="rId5"/>
-    <p:sldId id="328" r:id="rId6"/>
-    <p:sldId id="327" r:id="rId7"/>
-    <p:sldId id="329" r:id="rId8"/>
-    <p:sldId id="331" r:id="rId9"/>
-    <p:sldId id="330" r:id="rId10"/>
-    <p:sldId id="332" r:id="rId11"/>
-    <p:sldId id="334" r:id="rId12"/>
-    <p:sldId id="333" r:id="rId13"/>
+    <p:sldId id="306" r:id="rId3"/>
   </p:sldIdLst>
   <p:sldSz cx="12192000" cy="6858000"/>
   <p:notesSz cx="6858000" cy="9144000"/>
@@ -284,7 +274,7 @@
           <a:p>
             <a:fld id="{795C769C-ABF3-4C86-B447-994DD2EA1A41}" type="datetimeFigureOut">
               <a:rPr lang="en-CA" smtClean="0"/>
-              <a:t>2025-06-06</a:t>
+              <a:t>2025-06-14</a:t>
             </a:fld>
             <a:endParaRPr lang="en-CA"/>
           </a:p>
@@ -484,7 +474,7 @@
           <a:p>
             <a:fld id="{795C769C-ABF3-4C86-B447-994DD2EA1A41}" type="datetimeFigureOut">
               <a:rPr lang="en-CA" smtClean="0"/>
-              <a:t>2025-06-06</a:t>
+              <a:t>2025-06-14</a:t>
             </a:fld>
             <a:endParaRPr lang="en-CA"/>
           </a:p>
@@ -694,7 +684,7 @@
           <a:p>
             <a:fld id="{795C769C-ABF3-4C86-B447-994DD2EA1A41}" type="datetimeFigureOut">
               <a:rPr lang="en-CA" smtClean="0"/>
-              <a:t>2025-06-06</a:t>
+              <a:t>2025-06-14</a:t>
             </a:fld>
             <a:endParaRPr lang="en-CA"/>
           </a:p>
@@ -894,7 +884,7 @@
           <a:p>
             <a:fld id="{795C769C-ABF3-4C86-B447-994DD2EA1A41}" type="datetimeFigureOut">
               <a:rPr lang="en-CA" smtClean="0"/>
-              <a:t>2025-06-06</a:t>
+              <a:t>2025-06-14</a:t>
             </a:fld>
             <a:endParaRPr lang="en-CA"/>
           </a:p>
@@ -1170,7 +1160,7 @@
           <a:p>
             <a:fld id="{795C769C-ABF3-4C86-B447-994DD2EA1A41}" type="datetimeFigureOut">
               <a:rPr lang="en-CA" smtClean="0"/>
-              <a:t>2025-06-06</a:t>
+              <a:t>2025-06-14</a:t>
             </a:fld>
             <a:endParaRPr lang="en-CA"/>
           </a:p>
@@ -1438,7 +1428,7 @@
           <a:p>
             <a:fld id="{795C769C-ABF3-4C86-B447-994DD2EA1A41}" type="datetimeFigureOut">
               <a:rPr lang="en-CA" smtClean="0"/>
-              <a:t>2025-06-06</a:t>
+              <a:t>2025-06-14</a:t>
             </a:fld>
             <a:endParaRPr lang="en-CA"/>
           </a:p>
@@ -1853,7 +1843,7 @@
           <a:p>
             <a:fld id="{795C769C-ABF3-4C86-B447-994DD2EA1A41}" type="datetimeFigureOut">
               <a:rPr lang="en-CA" smtClean="0"/>
-              <a:t>2025-06-06</a:t>
+              <a:t>2025-06-14</a:t>
             </a:fld>
             <a:endParaRPr lang="en-CA"/>
           </a:p>
@@ -1995,7 +1985,7 @@
           <a:p>
             <a:fld id="{795C769C-ABF3-4C86-B447-994DD2EA1A41}" type="datetimeFigureOut">
               <a:rPr lang="en-CA" smtClean="0"/>
-              <a:t>2025-06-06</a:t>
+              <a:t>2025-06-14</a:t>
             </a:fld>
             <a:endParaRPr lang="en-CA"/>
           </a:p>
@@ -2108,7 +2098,7 @@
           <a:p>
             <a:fld id="{795C769C-ABF3-4C86-B447-994DD2EA1A41}" type="datetimeFigureOut">
               <a:rPr lang="en-CA" smtClean="0"/>
-              <a:t>2025-06-06</a:t>
+              <a:t>2025-06-14</a:t>
             </a:fld>
             <a:endParaRPr lang="en-CA"/>
           </a:p>
@@ -2421,7 +2411,7 @@
           <a:p>
             <a:fld id="{795C769C-ABF3-4C86-B447-994DD2EA1A41}" type="datetimeFigureOut">
               <a:rPr lang="en-CA" smtClean="0"/>
-              <a:t>2025-06-06</a:t>
+              <a:t>2025-06-14</a:t>
             </a:fld>
             <a:endParaRPr lang="en-CA"/>
           </a:p>
@@ -2710,7 +2700,7 @@
           <a:p>
             <a:fld id="{795C769C-ABF3-4C86-B447-994DD2EA1A41}" type="datetimeFigureOut">
               <a:rPr lang="en-CA" smtClean="0"/>
-              <a:t>2025-06-06</a:t>
+              <a:t>2025-06-14</a:t>
             </a:fld>
             <a:endParaRPr lang="en-CA"/>
           </a:p>
@@ -2953,7 +2943,7 @@
           <a:p>
             <a:fld id="{795C769C-ABF3-4C86-B447-994DD2EA1A41}" type="datetimeFigureOut">
               <a:rPr lang="en-CA" smtClean="0"/>
-              <a:t>2025-06-06</a:t>
+              <a:t>2025-06-14</a:t>
             </a:fld>
             <a:endParaRPr lang="en-CA"/>
           </a:p>
@@ -3372,34 +3362,6 @@
       </p:grpSpPr>
       <p:sp>
         <p:nvSpPr>
-          <p:cNvPr id="2" name="Title 1">
-            <a:extLst>
-              <a:ext uri="{FF2B5EF4-FFF2-40B4-BE49-F238E27FC236}">
-                <a16:creationId xmlns:a16="http://schemas.microsoft.com/office/drawing/2014/main" id="{873387C5-04AA-2231-4E59-D14F24B4E63B}"/>
-              </a:ext>
-            </a:extLst>
-          </p:cNvPr>
-          <p:cNvSpPr>
-            <a:spLocks noGrp="1"/>
-          </p:cNvSpPr>
-          <p:nvPr>
-            <p:ph type="ctrTitle"/>
-          </p:nvPr>
-        </p:nvSpPr>
-        <p:spPr/>
-        <p:txBody>
-          <a:bodyPr/>
-          <a:lstStyle/>
-          <a:p>
-            <a:r>
-              <a:rPr lang="en-CA"/>
-              <a:t>Manual (not Tecplot) cell connections</a:t>
-            </a:r>
-          </a:p>
-        </p:txBody>
-      </p:sp>
-      <p:sp>
-        <p:nvSpPr>
           <p:cNvPr id="4" name="Title 1">
             <a:extLst>
               <a:ext uri="{FF2B5EF4-FFF2-40B4-BE49-F238E27FC236}">
@@ -3447,7 +3409,96 @@
           <a:p>
             <a:r>
               <a:rPr lang="en-CA"/>
-              <a:t>Meeting May 27, 2025</a:t>
+              <a:t>Meeting June, 2025</a:t>
+            </a:r>
+          </a:p>
+        </p:txBody>
+      </p:sp>
+      <p:sp>
+        <p:nvSpPr>
+          <p:cNvPr id="3" name="TextBox 2">
+            <a:extLst>
+              <a:ext uri="{FF2B5EF4-FFF2-40B4-BE49-F238E27FC236}">
+                <a16:creationId xmlns:a16="http://schemas.microsoft.com/office/drawing/2014/main" id="{CBBFB73E-B10F-2107-1360-7BC4986413AE}"/>
+              </a:ext>
+            </a:extLst>
+          </p:cNvPr>
+          <p:cNvSpPr txBox="1"/>
+          <p:nvPr/>
+        </p:nvSpPr>
+        <p:spPr>
+          <a:xfrm>
+            <a:off x="838200" y="1123406"/>
+            <a:ext cx="8725988" cy="4832092"/>
+          </a:xfrm>
+          <a:prstGeom prst="rect">
+            <a:avLst/>
+          </a:prstGeom>
+          <a:noFill/>
+        </p:spPr>
+        <p:txBody>
+          <a:bodyPr wrap="square" rtlCol="0">
+            <a:spAutoFit/>
+          </a:bodyPr>
+          <a:lstStyle/>
+          <a:p>
+            <a:r>
+              <a:rPr lang="en-CA" sz="2800" b="1"/>
+              <a:t>Changes of note</a:t>
+            </a:r>
+            <a:r>
+              <a:rPr lang="en-CA" sz="2800"/>
+              <a:t>:</a:t>
+            </a:r>
+          </a:p>
+          <a:p>
+            <a:pPr marL="285750" indent="-285750">
+              <a:buFont typeface="Arial" panose="020B0604020202020204" pitchFamily="34" charset="0"/>
+              <a:buChar char="•"/>
+            </a:pPr>
+            <a:r>
+              <a:rPr lang="en-CA" sz="2800"/>
+              <a:t>MUT no longer requires Tecplot to generate IA, JA (ConnectionList) arrays</a:t>
+            </a:r>
+          </a:p>
+          <a:p>
+            <a:pPr marL="285750" indent="-285750">
+              <a:buFont typeface="Arial" panose="020B0604020202020204" pitchFamily="34" charset="0"/>
+              <a:buChar char="•"/>
+            </a:pPr>
+            <a:r>
+              <a:rPr lang="en-CA" sz="2800"/>
+              <a:t>There is a MUT_Batch program that has been configured to run the verification problems</a:t>
+            </a:r>
+          </a:p>
+          <a:p>
+            <a:pPr marL="285750" indent="-285750">
+              <a:buFont typeface="Arial" panose="020B0604020202020204" pitchFamily="34" charset="0"/>
+              <a:buChar char="•"/>
+            </a:pPr>
+            <a:r>
+              <a:rPr lang="en-CA" sz="2800"/>
+              <a:t>Simple saturated-flow case now runs but drawdown for the Theis pumping example is much less than predicted</a:t>
+            </a:r>
+          </a:p>
+          <a:p>
+            <a:pPr marL="285750" indent="-285750">
+              <a:buFont typeface="Arial" panose="020B0604020202020204" pitchFamily="34" charset="0"/>
+              <a:buChar char="•"/>
+            </a:pPr>
+            <a:r>
+              <a:rPr lang="en-CA" sz="2800"/>
+              <a:t>Bug with triangle boundry element having three boundary nodes fixed</a:t>
+            </a:r>
+          </a:p>
+          <a:p>
+            <a:pPr marL="285750" indent="-285750">
+              <a:buFont typeface="Arial" panose="020B0604020202020204" pitchFamily="34" charset="0"/>
+              <a:buChar char="•"/>
+            </a:pPr>
+            <a:r>
+              <a:rPr lang="en-CA" sz="2800"/>
+              <a:t>Tested verification suite with Release mode version of MUT</a:t>
             </a:r>
           </a:p>
         </p:txBody>
@@ -3456,264 +3507,6 @@
     <p:extLst>
       <p:ext uri="{BB962C8B-B14F-4D97-AF65-F5344CB8AC3E}">
         <p14:creationId xmlns:p14="http://schemas.microsoft.com/office/powerpoint/2010/main" val="2703993742"/>
-      </p:ext>
-    </p:extLst>
-  </p:cSld>
-  <p:clrMapOvr>
-    <a:masterClrMapping/>
-  </p:clrMapOvr>
-</p:sld>
-</file>
-
-<file path=ppt/slides/slide10.xml><?xml version="1.0" encoding="utf-8"?>
-<p:sld xmlns:a="http://schemas.openxmlformats.org/drawingml/2006/main" xmlns:r="http://schemas.openxmlformats.org/officeDocument/2006/relationships" xmlns:p="http://schemas.openxmlformats.org/presentationml/2006/main">
-  <p:cSld>
-    <p:spTree>
-      <p:nvGrpSpPr>
-        <p:cNvPr id="1" name=""/>
-        <p:cNvGrpSpPr/>
-        <p:nvPr/>
-      </p:nvGrpSpPr>
-      <p:grpSpPr>
-        <a:xfrm>
-          <a:off x="0" y="0"/>
-          <a:ext cx="0" cy="0"/>
-          <a:chOff x="0" y="0"/>
-          <a:chExt cx="0" cy="0"/>
-        </a:xfrm>
-      </p:grpSpPr>
-      <p:pic>
-        <p:nvPicPr>
-          <p:cNvPr id="3" name="Picture 2">
-            <a:extLst>
-              <a:ext uri="{FF2B5EF4-FFF2-40B4-BE49-F238E27FC236}">
-                <a16:creationId xmlns:a16="http://schemas.microsoft.com/office/drawing/2014/main" id="{FE713435-26AB-505D-C89E-0A1BD2E75408}"/>
-              </a:ext>
-            </a:extLst>
-          </p:cNvPr>
-          <p:cNvPicPr>
-            <a:picLocks noChangeAspect="1"/>
-          </p:cNvPicPr>
-          <p:nvPr/>
-        </p:nvPicPr>
-        <p:blipFill>
-          <a:blip r:embed="rId2"/>
-          <a:stretch>
-            <a:fillRect/>
-          </a:stretch>
-        </p:blipFill>
-        <p:spPr>
-          <a:xfrm>
-            <a:off x="0" y="0"/>
-            <a:ext cx="12192000" cy="6858000"/>
-          </a:xfrm>
-          <a:prstGeom prst="rect">
-            <a:avLst/>
-          </a:prstGeom>
-        </p:spPr>
-      </p:pic>
-      <p:sp>
-        <p:nvSpPr>
-          <p:cNvPr id="4" name="TextBox 3">
-            <a:extLst>
-              <a:ext uri="{FF2B5EF4-FFF2-40B4-BE49-F238E27FC236}">
-                <a16:creationId xmlns:a16="http://schemas.microsoft.com/office/drawing/2014/main" id="{F12BE35F-C1D1-CFF5-4243-0630282F42B0}"/>
-              </a:ext>
-            </a:extLst>
-          </p:cNvPr>
-          <p:cNvSpPr txBox="1"/>
-          <p:nvPr/>
-        </p:nvSpPr>
-        <p:spPr>
-          <a:xfrm>
-            <a:off x="7193281" y="104503"/>
-            <a:ext cx="4701830" cy="369332"/>
-          </a:xfrm>
-          <a:prstGeom prst="rect">
-            <a:avLst/>
-          </a:prstGeom>
-          <a:solidFill>
-            <a:srgbClr val="FFFF00"/>
-          </a:solidFill>
-        </p:spPr>
-        <p:txBody>
-          <a:bodyPr wrap="square" rtlCol="0">
-            <a:spAutoFit/>
-          </a:bodyPr>
-          <a:lstStyle/>
-          <a:p>
-            <a:r>
-              <a:rPr lang="en-CA"/>
-              <a:t>Node-centred</a:t>
-            </a:r>
-          </a:p>
-        </p:txBody>
-      </p:sp>
-    </p:spTree>
-    <p:extLst>
-      <p:ext uri="{BB962C8B-B14F-4D97-AF65-F5344CB8AC3E}">
-        <p14:creationId xmlns:p14="http://schemas.microsoft.com/office/powerpoint/2010/main" val="2916484403"/>
-      </p:ext>
-    </p:extLst>
-  </p:cSld>
-  <p:clrMapOvr>
-    <a:masterClrMapping/>
-  </p:clrMapOvr>
-</p:sld>
-</file>
-
-<file path=ppt/slides/slide11.xml><?xml version="1.0" encoding="utf-8"?>
-<p:sld xmlns:a="http://schemas.openxmlformats.org/drawingml/2006/main" xmlns:r="http://schemas.openxmlformats.org/officeDocument/2006/relationships" xmlns:p="http://schemas.openxmlformats.org/presentationml/2006/main">
-  <p:cSld>
-    <p:spTree>
-      <p:nvGrpSpPr>
-        <p:cNvPr id="1" name="">
-          <a:extLst>
-            <a:ext uri="{FF2B5EF4-FFF2-40B4-BE49-F238E27FC236}">
-              <a16:creationId xmlns:a16="http://schemas.microsoft.com/office/drawing/2014/main" id="{50172F41-354F-CA40-BA1C-2492611A943A}"/>
-            </a:ext>
-          </a:extLst>
-        </p:cNvPr>
-        <p:cNvGrpSpPr/>
-        <p:nvPr/>
-      </p:nvGrpSpPr>
-      <p:grpSpPr>
-        <a:xfrm>
-          <a:off x="0" y="0"/>
-          <a:ext cx="0" cy="0"/>
-          <a:chOff x="0" y="0"/>
-          <a:chExt cx="0" cy="0"/>
-        </a:xfrm>
-      </p:grpSpPr>
-      <p:sp>
-        <p:nvSpPr>
-          <p:cNvPr id="2" name="Title 1">
-            <a:extLst>
-              <a:ext uri="{FF2B5EF4-FFF2-40B4-BE49-F238E27FC236}">
-                <a16:creationId xmlns:a16="http://schemas.microsoft.com/office/drawing/2014/main" id="{E92DC116-BE26-8F06-535E-D2A68085AB22}"/>
-              </a:ext>
-            </a:extLst>
-          </p:cNvPr>
-          <p:cNvSpPr>
-            <a:spLocks noGrp="1"/>
-          </p:cNvSpPr>
-          <p:nvPr>
-            <p:ph type="title"/>
-          </p:nvPr>
-        </p:nvSpPr>
-        <p:spPr/>
-        <p:txBody>
-          <a:bodyPr>
-            <a:noAutofit/>
-          </a:bodyPr>
-          <a:lstStyle/>
-          <a:p>
-            <a:r>
-              <a:rPr lang="en-CA" sz="3600"/>
-              <a:t>7_SuperSlab problem results with latest version Modflow-User-Tools version  1.42 faces</a:t>
-            </a:r>
-            <a:br>
-              <a:rPr lang="en-CA" sz="3600"/>
-            </a:br>
-            <a:endParaRPr lang="en-CA" sz="3600"/>
-          </a:p>
-        </p:txBody>
-      </p:sp>
-      <p:sp>
-        <p:nvSpPr>
-          <p:cNvPr id="3" name="Content Placeholder 2">
-            <a:extLst>
-              <a:ext uri="{FF2B5EF4-FFF2-40B4-BE49-F238E27FC236}">
-                <a16:creationId xmlns:a16="http://schemas.microsoft.com/office/drawing/2014/main" id="{F23A8E60-947B-FF50-E1C8-8F71CFA2BD95}"/>
-              </a:ext>
-            </a:extLst>
-          </p:cNvPr>
-          <p:cNvSpPr>
-            <a:spLocks noGrp="1"/>
-          </p:cNvSpPr>
-          <p:nvPr>
-            <p:ph idx="1"/>
-          </p:nvPr>
-        </p:nvSpPr>
-        <p:spPr/>
-        <p:txBody>
-          <a:bodyPr/>
-          <a:lstStyle/>
-          <a:p>
-            <a:r>
-              <a:rPr lang="en-CA"/>
-              <a:t>Next  slides shows saturation at 4 hours</a:t>
-            </a:r>
-          </a:p>
-          <a:p>
-            <a:endParaRPr lang="en-CA"/>
-          </a:p>
-        </p:txBody>
-      </p:sp>
-    </p:spTree>
-    <p:extLst>
-      <p:ext uri="{BB962C8B-B14F-4D97-AF65-F5344CB8AC3E}">
-        <p14:creationId xmlns:p14="http://schemas.microsoft.com/office/powerpoint/2010/main" val="715516429"/>
-      </p:ext>
-    </p:extLst>
-  </p:cSld>
-  <p:clrMapOvr>
-    <a:masterClrMapping/>
-  </p:clrMapOvr>
-</p:sld>
-</file>
-
-<file path=ppt/slides/slide12.xml><?xml version="1.0" encoding="utf-8"?>
-<p:sld xmlns:a="http://schemas.openxmlformats.org/drawingml/2006/main" xmlns:r="http://schemas.openxmlformats.org/officeDocument/2006/relationships" xmlns:p="http://schemas.openxmlformats.org/presentationml/2006/main">
-  <p:cSld>
-    <p:spTree>
-      <p:nvGrpSpPr>
-        <p:cNvPr id="1" name=""/>
-        <p:cNvGrpSpPr/>
-        <p:nvPr/>
-      </p:nvGrpSpPr>
-      <p:grpSpPr>
-        <a:xfrm>
-          <a:off x="0" y="0"/>
-          <a:ext cx="0" cy="0"/>
-          <a:chOff x="0" y="0"/>
-          <a:chExt cx="0" cy="0"/>
-        </a:xfrm>
-      </p:grpSpPr>
-      <p:pic>
-        <p:nvPicPr>
-          <p:cNvPr id="3" name="Picture 2">
-            <a:extLst>
-              <a:ext uri="{FF2B5EF4-FFF2-40B4-BE49-F238E27FC236}">
-                <a16:creationId xmlns:a16="http://schemas.microsoft.com/office/drawing/2014/main" id="{1BDB8354-0DEC-6783-2601-789722FFAFAC}"/>
-              </a:ext>
-            </a:extLst>
-          </p:cNvPr>
-          <p:cNvPicPr>
-            <a:picLocks noChangeAspect="1"/>
-          </p:cNvPicPr>
-          <p:nvPr/>
-        </p:nvPicPr>
-        <p:blipFill>
-          <a:blip r:embed="rId2"/>
-          <a:stretch>
-            <a:fillRect/>
-          </a:stretch>
-        </p:blipFill>
-        <p:spPr>
-          <a:xfrm>
-            <a:off x="0" y="0"/>
-            <a:ext cx="12192000" cy="6858000"/>
-          </a:xfrm>
-          <a:prstGeom prst="rect">
-            <a:avLst/>
-          </a:prstGeom>
-        </p:spPr>
-      </p:pic>
-    </p:spTree>
-    <p:extLst>
-      <p:ext uri="{BB962C8B-B14F-4D97-AF65-F5344CB8AC3E}">
-        <p14:creationId xmlns:p14="http://schemas.microsoft.com/office/powerpoint/2010/main" val="385575036"/>
       </p:ext>
     </p:extLst>
   </p:cSld>
@@ -3745,7 +3538,7 @@
           <p:cNvPr id="2" name="Title 1">
             <a:extLst>
               <a:ext uri="{FF2B5EF4-FFF2-40B4-BE49-F238E27FC236}">
-                <a16:creationId xmlns:a16="http://schemas.microsoft.com/office/drawing/2014/main" id="{BC65F54F-94D9-62F1-C936-8781313CEA4B}"/>
+                <a16:creationId xmlns:a16="http://schemas.microsoft.com/office/drawing/2014/main" id="{62D8E182-628E-FD31-CDD7-0953E8635543}"/>
               </a:ext>
             </a:extLst>
           </p:cNvPr>
@@ -3763,7 +3556,7 @@
           <a:p>
             <a:r>
               <a:rPr lang="en-CA"/>
-              <a:t>Abdul problem mesh-centred outflow results</a:t>
+              <a:t>MUT_Batch</a:t>
             </a:r>
           </a:p>
         </p:txBody>
@@ -3773,7 +3566,7 @@
           <p:cNvPr id="3" name="Content Placeholder 2">
             <a:extLst>
               <a:ext uri="{FF2B5EF4-FFF2-40B4-BE49-F238E27FC236}">
-                <a16:creationId xmlns:a16="http://schemas.microsoft.com/office/drawing/2014/main" id="{0B00757F-8EBE-10AC-8FEA-0499BF693616}"/>
+                <a16:creationId xmlns:a16="http://schemas.microsoft.com/office/drawing/2014/main" id="{CA444FF4-B956-3AC6-8A55-5546A3FD4368}"/>
               </a:ext>
             </a:extLst>
           </p:cNvPr>
@@ -3791,696 +3584,48 @@
           <a:p>
             <a:r>
               <a:rPr lang="en-CA"/>
-              <a:t>Next 2 slides compare the results before and after code modification</a:t>
-            </a:r>
+              <a:t>This is similar to the old HGS HSBatch program</a:t>
+            </a:r>
+          </a:p>
+          <a:p>
+            <a:r>
+              <a:rPr lang="en-CA"/>
+              <a:t>The repository is here:</a:t>
+            </a:r>
+          </a:p>
+          <a:p>
+            <a:pPr marL="914400" lvl="2" indent="0">
+              <a:buNone/>
+            </a:pPr>
+            <a:r>
+              <a:rPr lang="en-CA">
+                <a:hlinkClick r:id="rId2"/>
+              </a:rPr>
+              <a:t>https://github.com/Grdbldr/MUT_Batch.git</a:t>
+            </a:r>
+            <a:endParaRPr lang="en-CA"/>
+          </a:p>
+          <a:p>
+            <a:pPr marL="914400" lvl="2" indent="0">
+              <a:buNone/>
+            </a:pPr>
+            <a:endParaRPr lang="en-CA"/>
+          </a:p>
+          <a:p>
+            <a:endParaRPr lang="en-CA"/>
+          </a:p>
+          <a:p>
+            <a:endParaRPr lang="en-CA"/>
+          </a:p>
+          <a:p>
+            <a:endParaRPr lang="en-CA"/>
           </a:p>
         </p:txBody>
       </p:sp>
     </p:spTree>
     <p:extLst>
       <p:ext uri="{BB962C8B-B14F-4D97-AF65-F5344CB8AC3E}">
-        <p14:creationId xmlns:p14="http://schemas.microsoft.com/office/powerpoint/2010/main" val="507361375"/>
-      </p:ext>
-    </p:extLst>
-  </p:cSld>
-  <p:clrMapOvr>
-    <a:masterClrMapping/>
-  </p:clrMapOvr>
-</p:sld>
-</file>
-
-<file path=ppt/slides/slide3.xml><?xml version="1.0" encoding="utf-8"?>
-<p:sld xmlns:a="http://schemas.openxmlformats.org/drawingml/2006/main" xmlns:r="http://schemas.openxmlformats.org/officeDocument/2006/relationships" xmlns:p="http://schemas.openxmlformats.org/presentationml/2006/main">
-  <p:cSld>
-    <p:spTree>
-      <p:nvGrpSpPr>
-        <p:cNvPr id="1" name=""/>
-        <p:cNvGrpSpPr/>
-        <p:nvPr/>
-      </p:nvGrpSpPr>
-      <p:grpSpPr>
-        <a:xfrm>
-          <a:off x="0" y="0"/>
-          <a:ext cx="0" cy="0"/>
-          <a:chOff x="0" y="0"/>
-          <a:chExt cx="0" cy="0"/>
-        </a:xfrm>
-      </p:grpSpPr>
-      <p:pic>
-        <p:nvPicPr>
-          <p:cNvPr id="8" name="Picture 7">
-            <a:extLst>
-              <a:ext uri="{FF2B5EF4-FFF2-40B4-BE49-F238E27FC236}">
-                <a16:creationId xmlns:a16="http://schemas.microsoft.com/office/drawing/2014/main" id="{00B0F6D8-8C90-B33A-9516-28C7F55801CB}"/>
-              </a:ext>
-            </a:extLst>
-          </p:cNvPr>
-          <p:cNvPicPr>
-            <a:picLocks noChangeAspect="1"/>
-          </p:cNvPicPr>
-          <p:nvPr/>
-        </p:nvPicPr>
-        <p:blipFill>
-          <a:blip r:embed="rId2"/>
-          <a:stretch>
-            <a:fillRect/>
-          </a:stretch>
-        </p:blipFill>
-        <p:spPr>
-          <a:xfrm>
-            <a:off x="0" y="0"/>
-            <a:ext cx="12192000" cy="6858000"/>
-          </a:xfrm>
-          <a:prstGeom prst="rect">
-            <a:avLst/>
-          </a:prstGeom>
-        </p:spPr>
-      </p:pic>
-      <p:sp>
-        <p:nvSpPr>
-          <p:cNvPr id="6" name="TextBox 5">
-            <a:extLst>
-              <a:ext uri="{FF2B5EF4-FFF2-40B4-BE49-F238E27FC236}">
-                <a16:creationId xmlns:a16="http://schemas.microsoft.com/office/drawing/2014/main" id="{80DFB4FD-988F-F64D-6AFF-B9FFD6DD7313}"/>
-              </a:ext>
-            </a:extLst>
-          </p:cNvPr>
-          <p:cNvSpPr txBox="1"/>
-          <p:nvPr/>
-        </p:nvSpPr>
-        <p:spPr>
-          <a:xfrm>
-            <a:off x="7193281" y="104503"/>
-            <a:ext cx="4701830" cy="369332"/>
-          </a:xfrm>
-          <a:prstGeom prst="rect">
-            <a:avLst/>
-          </a:prstGeom>
-          <a:solidFill>
-            <a:srgbClr val="FFFF00"/>
-          </a:solidFill>
-        </p:spPr>
-        <p:txBody>
-          <a:bodyPr wrap="square" rtlCol="0">
-            <a:spAutoFit/>
-          </a:bodyPr>
-          <a:lstStyle/>
-          <a:p>
-            <a:r>
-              <a:rPr lang="en-CA"/>
-              <a:t>Modflow-User-Tools version  1.40 Beta</a:t>
-            </a:r>
-          </a:p>
-        </p:txBody>
-      </p:sp>
-    </p:spTree>
-    <p:extLst>
-      <p:ext uri="{BB962C8B-B14F-4D97-AF65-F5344CB8AC3E}">
-        <p14:creationId xmlns:p14="http://schemas.microsoft.com/office/powerpoint/2010/main" val="733638606"/>
-      </p:ext>
-    </p:extLst>
-  </p:cSld>
-  <p:clrMapOvr>
-    <a:masterClrMapping/>
-  </p:clrMapOvr>
-</p:sld>
-</file>
-
-<file path=ppt/slides/slide4.xml><?xml version="1.0" encoding="utf-8"?>
-<p:sld xmlns:a="http://schemas.openxmlformats.org/drawingml/2006/main" xmlns:r="http://schemas.openxmlformats.org/officeDocument/2006/relationships" xmlns:p="http://schemas.openxmlformats.org/presentationml/2006/main">
-  <p:cSld>
-    <p:spTree>
-      <p:nvGrpSpPr>
-        <p:cNvPr id="1" name=""/>
-        <p:cNvGrpSpPr/>
-        <p:nvPr/>
-      </p:nvGrpSpPr>
-      <p:grpSpPr>
-        <a:xfrm>
-          <a:off x="0" y="0"/>
-          <a:ext cx="0" cy="0"/>
-          <a:chOff x="0" y="0"/>
-          <a:chExt cx="0" cy="0"/>
-        </a:xfrm>
-      </p:grpSpPr>
-      <p:pic>
-        <p:nvPicPr>
-          <p:cNvPr id="5" name="Picture 4">
-            <a:extLst>
-              <a:ext uri="{FF2B5EF4-FFF2-40B4-BE49-F238E27FC236}">
-                <a16:creationId xmlns:a16="http://schemas.microsoft.com/office/drawing/2014/main" id="{03744447-9279-2C6A-260C-327AAF1E5C0D}"/>
-              </a:ext>
-            </a:extLst>
-          </p:cNvPr>
-          <p:cNvPicPr>
-            <a:picLocks noChangeAspect="1"/>
-          </p:cNvPicPr>
-          <p:nvPr/>
-        </p:nvPicPr>
-        <p:blipFill>
-          <a:blip r:embed="rId2"/>
-          <a:stretch>
-            <a:fillRect/>
-          </a:stretch>
-        </p:blipFill>
-        <p:spPr>
-          <a:xfrm>
-            <a:off x="0" y="0"/>
-            <a:ext cx="12192000" cy="6858000"/>
-          </a:xfrm>
-          <a:prstGeom prst="rect">
-            <a:avLst/>
-          </a:prstGeom>
-        </p:spPr>
-      </p:pic>
-      <p:sp>
-        <p:nvSpPr>
-          <p:cNvPr id="4" name="TextBox 3">
-            <a:extLst>
-              <a:ext uri="{FF2B5EF4-FFF2-40B4-BE49-F238E27FC236}">
-                <a16:creationId xmlns:a16="http://schemas.microsoft.com/office/drawing/2014/main" id="{BB589936-1D41-73CC-EE55-D0A81E4C0B48}"/>
-              </a:ext>
-            </a:extLst>
-          </p:cNvPr>
-          <p:cNvSpPr txBox="1"/>
-          <p:nvPr/>
-        </p:nvSpPr>
-        <p:spPr>
-          <a:xfrm>
-            <a:off x="7193281" y="104503"/>
-            <a:ext cx="4701830" cy="369332"/>
-          </a:xfrm>
-          <a:prstGeom prst="rect">
-            <a:avLst/>
-          </a:prstGeom>
-          <a:solidFill>
-            <a:srgbClr val="FFFF00"/>
-          </a:solidFill>
-        </p:spPr>
-        <p:txBody>
-          <a:bodyPr wrap="square" rtlCol="0">
-            <a:spAutoFit/>
-          </a:bodyPr>
-          <a:lstStyle/>
-          <a:p>
-            <a:r>
-              <a:rPr lang="en-CA"/>
-              <a:t>Modflow-User-Tools version  1.42 faces</a:t>
-            </a:r>
-          </a:p>
-        </p:txBody>
-      </p:sp>
-    </p:spTree>
-    <p:extLst>
-      <p:ext uri="{BB962C8B-B14F-4D97-AF65-F5344CB8AC3E}">
-        <p14:creationId xmlns:p14="http://schemas.microsoft.com/office/powerpoint/2010/main" val="3630454788"/>
-      </p:ext>
-    </p:extLst>
-  </p:cSld>
-  <p:clrMapOvr>
-    <a:masterClrMapping/>
-  </p:clrMapOvr>
-</p:sld>
-</file>
-
-<file path=ppt/slides/slide5.xml><?xml version="1.0" encoding="utf-8"?>
-<p:sld xmlns:a="http://schemas.openxmlformats.org/drawingml/2006/main" xmlns:r="http://schemas.openxmlformats.org/officeDocument/2006/relationships" xmlns:p="http://schemas.openxmlformats.org/presentationml/2006/main">
-  <p:cSld>
-    <p:spTree>
-      <p:nvGrpSpPr>
-        <p:cNvPr id="1" name="">
-          <a:extLst>
-            <a:ext uri="{FF2B5EF4-FFF2-40B4-BE49-F238E27FC236}">
-              <a16:creationId xmlns:a16="http://schemas.microsoft.com/office/drawing/2014/main" id="{9E729398-C4EC-2F67-E845-EDA93BF30F73}"/>
-            </a:ext>
-          </a:extLst>
-        </p:cNvPr>
-        <p:cNvGrpSpPr/>
-        <p:nvPr/>
-      </p:nvGrpSpPr>
-      <p:grpSpPr>
-        <a:xfrm>
-          <a:off x="0" y="0"/>
-          <a:ext cx="0" cy="0"/>
-          <a:chOff x="0" y="0"/>
-          <a:chExt cx="0" cy="0"/>
-        </a:xfrm>
-      </p:grpSpPr>
-      <p:sp>
-        <p:nvSpPr>
-          <p:cNvPr id="2" name="Title 1">
-            <a:extLst>
-              <a:ext uri="{FF2B5EF4-FFF2-40B4-BE49-F238E27FC236}">
-                <a16:creationId xmlns:a16="http://schemas.microsoft.com/office/drawing/2014/main" id="{A42ED167-0EC4-9897-D760-8AA2D6AC6DAB}"/>
-              </a:ext>
-            </a:extLst>
-          </p:cNvPr>
-          <p:cNvSpPr>
-            <a:spLocks noGrp="1"/>
-          </p:cNvSpPr>
-          <p:nvPr>
-            <p:ph type="title"/>
-          </p:nvPr>
-        </p:nvSpPr>
-        <p:spPr/>
-        <p:txBody>
-          <a:bodyPr/>
-          <a:lstStyle/>
-          <a:p>
-            <a:r>
-              <a:rPr lang="en-CA"/>
-              <a:t>Abdul problem node-centred outflow results</a:t>
-            </a:r>
-          </a:p>
-        </p:txBody>
-      </p:sp>
-      <p:sp>
-        <p:nvSpPr>
-          <p:cNvPr id="3" name="Content Placeholder 2">
-            <a:extLst>
-              <a:ext uri="{FF2B5EF4-FFF2-40B4-BE49-F238E27FC236}">
-                <a16:creationId xmlns:a16="http://schemas.microsoft.com/office/drawing/2014/main" id="{D4CDF680-0FEA-843D-DD0D-9D6554323805}"/>
-              </a:ext>
-            </a:extLst>
-          </p:cNvPr>
-          <p:cNvSpPr>
-            <a:spLocks noGrp="1"/>
-          </p:cNvSpPr>
-          <p:nvPr>
-            <p:ph idx="1"/>
-          </p:nvPr>
-        </p:nvSpPr>
-        <p:spPr/>
-        <p:txBody>
-          <a:bodyPr/>
-          <a:lstStyle/>
-          <a:p>
-            <a:r>
-              <a:rPr lang="en-CA"/>
-              <a:t>Next 2 slides compare the results before and after code modification</a:t>
-            </a:r>
-          </a:p>
-          <a:p>
-            <a:endParaRPr lang="en-CA"/>
-          </a:p>
-        </p:txBody>
-      </p:sp>
-    </p:spTree>
-    <p:extLst>
-      <p:ext uri="{BB962C8B-B14F-4D97-AF65-F5344CB8AC3E}">
-        <p14:creationId xmlns:p14="http://schemas.microsoft.com/office/powerpoint/2010/main" val="424300905"/>
-      </p:ext>
-    </p:extLst>
-  </p:cSld>
-  <p:clrMapOvr>
-    <a:masterClrMapping/>
-  </p:clrMapOvr>
-</p:sld>
-</file>
-
-<file path=ppt/slides/slide6.xml><?xml version="1.0" encoding="utf-8"?>
-<p:sld xmlns:a="http://schemas.openxmlformats.org/drawingml/2006/main" xmlns:r="http://schemas.openxmlformats.org/officeDocument/2006/relationships" xmlns:p="http://schemas.openxmlformats.org/presentationml/2006/main">
-  <p:cSld>
-    <p:spTree>
-      <p:nvGrpSpPr>
-        <p:cNvPr id="1" name=""/>
-        <p:cNvGrpSpPr/>
-        <p:nvPr/>
-      </p:nvGrpSpPr>
-      <p:grpSpPr>
-        <a:xfrm>
-          <a:off x="0" y="0"/>
-          <a:ext cx="0" cy="0"/>
-          <a:chOff x="0" y="0"/>
-          <a:chExt cx="0" cy="0"/>
-        </a:xfrm>
-      </p:grpSpPr>
-      <p:pic>
-        <p:nvPicPr>
-          <p:cNvPr id="3" name="Picture 2">
-            <a:extLst>
-              <a:ext uri="{FF2B5EF4-FFF2-40B4-BE49-F238E27FC236}">
-                <a16:creationId xmlns:a16="http://schemas.microsoft.com/office/drawing/2014/main" id="{4E617B2A-23F9-01DA-E347-2BDE93D8275A}"/>
-              </a:ext>
-            </a:extLst>
-          </p:cNvPr>
-          <p:cNvPicPr>
-            <a:picLocks noChangeAspect="1"/>
-          </p:cNvPicPr>
-          <p:nvPr/>
-        </p:nvPicPr>
-        <p:blipFill>
-          <a:blip r:embed="rId2"/>
-          <a:stretch>
-            <a:fillRect/>
-          </a:stretch>
-        </p:blipFill>
-        <p:spPr>
-          <a:xfrm>
-            <a:off x="0" y="0"/>
-            <a:ext cx="12192000" cy="6858000"/>
-          </a:xfrm>
-          <a:prstGeom prst="rect">
-            <a:avLst/>
-          </a:prstGeom>
-        </p:spPr>
-      </p:pic>
-      <p:sp>
-        <p:nvSpPr>
-          <p:cNvPr id="4" name="TextBox 3">
-            <a:extLst>
-              <a:ext uri="{FF2B5EF4-FFF2-40B4-BE49-F238E27FC236}">
-                <a16:creationId xmlns:a16="http://schemas.microsoft.com/office/drawing/2014/main" id="{F66DC885-6DF4-274C-9EC6-8FD73B003CAB}"/>
-              </a:ext>
-            </a:extLst>
-          </p:cNvPr>
-          <p:cNvSpPr txBox="1"/>
-          <p:nvPr/>
-        </p:nvSpPr>
-        <p:spPr>
-          <a:xfrm>
-            <a:off x="7193281" y="104503"/>
-            <a:ext cx="4701830" cy="369332"/>
-          </a:xfrm>
-          <a:prstGeom prst="rect">
-            <a:avLst/>
-          </a:prstGeom>
-          <a:solidFill>
-            <a:srgbClr val="FFFF00"/>
-          </a:solidFill>
-        </p:spPr>
-        <p:txBody>
-          <a:bodyPr wrap="square" rtlCol="0">
-            <a:spAutoFit/>
-          </a:bodyPr>
-          <a:lstStyle/>
-          <a:p>
-            <a:r>
-              <a:rPr lang="en-CA"/>
-              <a:t>Modflow-User-Tools version  1.40 Beta</a:t>
-            </a:r>
-          </a:p>
-        </p:txBody>
-      </p:sp>
-    </p:spTree>
-    <p:extLst>
-      <p:ext uri="{BB962C8B-B14F-4D97-AF65-F5344CB8AC3E}">
-        <p14:creationId xmlns:p14="http://schemas.microsoft.com/office/powerpoint/2010/main" val="909064823"/>
-      </p:ext>
-    </p:extLst>
-  </p:cSld>
-  <p:clrMapOvr>
-    <a:masterClrMapping/>
-  </p:clrMapOvr>
-</p:sld>
-</file>
-
-<file path=ppt/slides/slide7.xml><?xml version="1.0" encoding="utf-8"?>
-<p:sld xmlns:a="http://schemas.openxmlformats.org/drawingml/2006/main" xmlns:r="http://schemas.openxmlformats.org/officeDocument/2006/relationships" xmlns:p="http://schemas.openxmlformats.org/presentationml/2006/main">
-  <p:cSld>
-    <p:spTree>
-      <p:nvGrpSpPr>
-        <p:cNvPr id="1" name=""/>
-        <p:cNvGrpSpPr/>
-        <p:nvPr/>
-      </p:nvGrpSpPr>
-      <p:grpSpPr>
-        <a:xfrm>
-          <a:off x="0" y="0"/>
-          <a:ext cx="0" cy="0"/>
-          <a:chOff x="0" y="0"/>
-          <a:chExt cx="0" cy="0"/>
-        </a:xfrm>
-      </p:grpSpPr>
-      <p:pic>
-        <p:nvPicPr>
-          <p:cNvPr id="3" name="Picture 2">
-            <a:extLst>
-              <a:ext uri="{FF2B5EF4-FFF2-40B4-BE49-F238E27FC236}">
-                <a16:creationId xmlns:a16="http://schemas.microsoft.com/office/drawing/2014/main" id="{C7873926-1053-4113-B7E2-8E912474F551}"/>
-              </a:ext>
-            </a:extLst>
-          </p:cNvPr>
-          <p:cNvPicPr>
-            <a:picLocks noChangeAspect="1"/>
-          </p:cNvPicPr>
-          <p:nvPr/>
-        </p:nvPicPr>
-        <p:blipFill>
-          <a:blip r:embed="rId2"/>
-          <a:stretch>
-            <a:fillRect/>
-          </a:stretch>
-        </p:blipFill>
-        <p:spPr>
-          <a:xfrm>
-            <a:off x="0" y="0"/>
-            <a:ext cx="12192000" cy="6858000"/>
-          </a:xfrm>
-          <a:prstGeom prst="rect">
-            <a:avLst/>
-          </a:prstGeom>
-        </p:spPr>
-      </p:pic>
-      <p:sp>
-        <p:nvSpPr>
-          <p:cNvPr id="4" name="TextBox 3">
-            <a:extLst>
-              <a:ext uri="{FF2B5EF4-FFF2-40B4-BE49-F238E27FC236}">
-                <a16:creationId xmlns:a16="http://schemas.microsoft.com/office/drawing/2014/main" id="{96F1E277-BE2D-0F2A-30B3-74F486D6736C}"/>
-              </a:ext>
-            </a:extLst>
-          </p:cNvPr>
-          <p:cNvSpPr txBox="1"/>
-          <p:nvPr/>
-        </p:nvSpPr>
-        <p:spPr>
-          <a:xfrm>
-            <a:off x="7193281" y="104503"/>
-            <a:ext cx="4701830" cy="369332"/>
-          </a:xfrm>
-          <a:prstGeom prst="rect">
-            <a:avLst/>
-          </a:prstGeom>
-          <a:solidFill>
-            <a:srgbClr val="FFFF00"/>
-          </a:solidFill>
-        </p:spPr>
-        <p:txBody>
-          <a:bodyPr wrap="square" rtlCol="0">
-            <a:spAutoFit/>
-          </a:bodyPr>
-          <a:lstStyle/>
-          <a:p>
-            <a:r>
-              <a:rPr lang="en-CA"/>
-              <a:t>Modflow-User-Tools version  1.42 faces</a:t>
-            </a:r>
-          </a:p>
-        </p:txBody>
-      </p:sp>
-    </p:spTree>
-    <p:extLst>
-      <p:ext uri="{BB962C8B-B14F-4D97-AF65-F5344CB8AC3E}">
-        <p14:creationId xmlns:p14="http://schemas.microsoft.com/office/powerpoint/2010/main" val="1742918837"/>
-      </p:ext>
-    </p:extLst>
-  </p:cSld>
-  <p:clrMapOvr>
-    <a:masterClrMapping/>
-  </p:clrMapOvr>
-</p:sld>
-</file>
-
-<file path=ppt/slides/slide8.xml><?xml version="1.0" encoding="utf-8"?>
-<p:sld xmlns:a="http://schemas.openxmlformats.org/drawingml/2006/main" xmlns:r="http://schemas.openxmlformats.org/officeDocument/2006/relationships" xmlns:p="http://schemas.openxmlformats.org/presentationml/2006/main">
-  <p:cSld>
-    <p:spTree>
-      <p:nvGrpSpPr>
-        <p:cNvPr id="1" name="">
-          <a:extLst>
-            <a:ext uri="{FF2B5EF4-FFF2-40B4-BE49-F238E27FC236}">
-              <a16:creationId xmlns:a16="http://schemas.microsoft.com/office/drawing/2014/main" id="{B9EF3C46-FECF-8F05-2CB6-396D3DAAEF78}"/>
-            </a:ext>
-          </a:extLst>
-        </p:cNvPr>
-        <p:cNvGrpSpPr/>
-        <p:nvPr/>
-      </p:nvGrpSpPr>
-      <p:grpSpPr>
-        <a:xfrm>
-          <a:off x="0" y="0"/>
-          <a:ext cx="0" cy="0"/>
-          <a:chOff x="0" y="0"/>
-          <a:chExt cx="0" cy="0"/>
-        </a:xfrm>
-      </p:grpSpPr>
-      <p:sp>
-        <p:nvSpPr>
-          <p:cNvPr id="2" name="Title 1">
-            <a:extLst>
-              <a:ext uri="{FF2B5EF4-FFF2-40B4-BE49-F238E27FC236}">
-                <a16:creationId xmlns:a16="http://schemas.microsoft.com/office/drawing/2014/main" id="{F459A5A8-A8B8-9548-12FC-A3041B380D79}"/>
-              </a:ext>
-            </a:extLst>
-          </p:cNvPr>
-          <p:cNvSpPr>
-            <a:spLocks noGrp="1"/>
-          </p:cNvSpPr>
-          <p:nvPr>
-            <p:ph type="title"/>
-          </p:nvPr>
-        </p:nvSpPr>
-        <p:spPr/>
-        <p:txBody>
-          <a:bodyPr>
-            <a:noAutofit/>
-          </a:bodyPr>
-          <a:lstStyle/>
-          <a:p>
-            <a:r>
-              <a:rPr lang="en-CA" sz="3600"/>
-              <a:t>8_V_catchment problem outflow results with latest version Modflow-User-Tools version  1.42 faces</a:t>
-            </a:r>
-            <a:br>
-              <a:rPr lang="en-CA" sz="3600"/>
-            </a:br>
-            <a:endParaRPr lang="en-CA" sz="3600"/>
-          </a:p>
-        </p:txBody>
-      </p:sp>
-      <p:sp>
-        <p:nvSpPr>
-          <p:cNvPr id="3" name="Content Placeholder 2">
-            <a:extLst>
-              <a:ext uri="{FF2B5EF4-FFF2-40B4-BE49-F238E27FC236}">
-                <a16:creationId xmlns:a16="http://schemas.microsoft.com/office/drawing/2014/main" id="{018833DF-DE18-A2E7-1429-9B5F0341C080}"/>
-              </a:ext>
-            </a:extLst>
-          </p:cNvPr>
-          <p:cNvSpPr>
-            <a:spLocks noGrp="1"/>
-          </p:cNvSpPr>
-          <p:nvPr>
-            <p:ph idx="1"/>
-          </p:nvPr>
-        </p:nvSpPr>
-        <p:spPr/>
-        <p:txBody>
-          <a:bodyPr/>
-          <a:lstStyle/>
-          <a:p>
-            <a:r>
-              <a:rPr lang="en-CA"/>
-              <a:t>Next 2 slides compare the results for mesh vs node-centred approaches</a:t>
-            </a:r>
-          </a:p>
-          <a:p>
-            <a:endParaRPr lang="en-CA"/>
-          </a:p>
-        </p:txBody>
-      </p:sp>
-    </p:spTree>
-    <p:extLst>
-      <p:ext uri="{BB962C8B-B14F-4D97-AF65-F5344CB8AC3E}">
-        <p14:creationId xmlns:p14="http://schemas.microsoft.com/office/powerpoint/2010/main" val="246194393"/>
-      </p:ext>
-    </p:extLst>
-  </p:cSld>
-  <p:clrMapOvr>
-    <a:masterClrMapping/>
-  </p:clrMapOvr>
-</p:sld>
-</file>
-
-<file path=ppt/slides/slide9.xml><?xml version="1.0" encoding="utf-8"?>
-<p:sld xmlns:a="http://schemas.openxmlformats.org/drawingml/2006/main" xmlns:r="http://schemas.openxmlformats.org/officeDocument/2006/relationships" xmlns:p="http://schemas.openxmlformats.org/presentationml/2006/main">
-  <p:cSld>
-    <p:spTree>
-      <p:nvGrpSpPr>
-        <p:cNvPr id="1" name=""/>
-        <p:cNvGrpSpPr/>
-        <p:nvPr/>
-      </p:nvGrpSpPr>
-      <p:grpSpPr>
-        <a:xfrm>
-          <a:off x="0" y="0"/>
-          <a:ext cx="0" cy="0"/>
-          <a:chOff x="0" y="0"/>
-          <a:chExt cx="0" cy="0"/>
-        </a:xfrm>
-      </p:grpSpPr>
-      <p:pic>
-        <p:nvPicPr>
-          <p:cNvPr id="3" name="Picture 2">
-            <a:extLst>
-              <a:ext uri="{FF2B5EF4-FFF2-40B4-BE49-F238E27FC236}">
-                <a16:creationId xmlns:a16="http://schemas.microsoft.com/office/drawing/2014/main" id="{C54463A1-7A2F-3AA6-1446-CDB16275DF53}"/>
-              </a:ext>
-            </a:extLst>
-          </p:cNvPr>
-          <p:cNvPicPr>
-            <a:picLocks noChangeAspect="1"/>
-          </p:cNvPicPr>
-          <p:nvPr/>
-        </p:nvPicPr>
-        <p:blipFill>
-          <a:blip r:embed="rId2"/>
-          <a:stretch>
-            <a:fillRect/>
-          </a:stretch>
-        </p:blipFill>
-        <p:spPr>
-          <a:xfrm>
-            <a:off x="0" y="0"/>
-            <a:ext cx="12192000" cy="6858000"/>
-          </a:xfrm>
-          <a:prstGeom prst="rect">
-            <a:avLst/>
-          </a:prstGeom>
-        </p:spPr>
-      </p:pic>
-      <p:sp>
-        <p:nvSpPr>
-          <p:cNvPr id="4" name="TextBox 3">
-            <a:extLst>
-              <a:ext uri="{FF2B5EF4-FFF2-40B4-BE49-F238E27FC236}">
-                <a16:creationId xmlns:a16="http://schemas.microsoft.com/office/drawing/2014/main" id="{A44FDED1-EAB1-7BCE-03C1-7AB918E9C656}"/>
-              </a:ext>
-            </a:extLst>
-          </p:cNvPr>
-          <p:cNvSpPr txBox="1"/>
-          <p:nvPr/>
-        </p:nvSpPr>
-        <p:spPr>
-          <a:xfrm>
-            <a:off x="7193281" y="104503"/>
-            <a:ext cx="4701830" cy="369332"/>
-          </a:xfrm>
-          <a:prstGeom prst="rect">
-            <a:avLst/>
-          </a:prstGeom>
-          <a:solidFill>
-            <a:srgbClr val="FFFF00"/>
-          </a:solidFill>
-        </p:spPr>
-        <p:txBody>
-          <a:bodyPr wrap="square" rtlCol="0">
-            <a:spAutoFit/>
-          </a:bodyPr>
-          <a:lstStyle/>
-          <a:p>
-            <a:r>
-              <a:rPr lang="en-CA"/>
-              <a:t>Mesh-centred</a:t>
-            </a:r>
-          </a:p>
-        </p:txBody>
-      </p:sp>
-    </p:spTree>
-    <p:extLst>
-      <p:ext uri="{BB962C8B-B14F-4D97-AF65-F5344CB8AC3E}">
-        <p14:creationId xmlns:p14="http://schemas.microsoft.com/office/powerpoint/2010/main" val="3610086033"/>
+        <p14:creationId xmlns:p14="http://schemas.microsoft.com/office/powerpoint/2010/main" val="1863741516"/>
       </p:ext>
     </p:extLst>
   </p:cSld>

</xml_diff>